<commit_message>
Add data analytics training materials, prompts collection, and Excel AI exercises
</commit_message>
<xml_diff>
--- a/Data_Analytics_Training_Comprehensive.pptx
+++ b/Data_Analytics_Training_Comprehensive.pptx
@@ -10041,7 +10041,7 @@
             </a:r>
             <a:r>
               <a:rPr lang="en-US" sz="1300" b="1" dirty="0"/>
-              <a:t> today. But you will learn to ask the right questions so data serves you, not the other way around.</a:t>
+              <a:t> today. But you will learn to ask the right questions, so data serves you, not the other way around.</a:t>
             </a:r>
             <a:endParaRPr lang="en-PK" sz="1300" b="1" dirty="0"/>
           </a:p>
@@ -17143,7 +17143,7 @@
                   <a:srgbClr val="2C3E50"/>
                 </a:solidFill>
               </a:rPr>
-              <a:t>• Select one of the four cases presented</a:t>
+              <a:t>• Select one  cases </a:t>
             </a:r>
             <a:endParaRPr lang="en-US" sz="1000" dirty="0"/>
           </a:p>
@@ -18734,7 +18734,7 @@
                   <a:srgbClr val="333333"/>
                 </a:solidFill>
               </a:rPr>
-              <a:t>Key Insight from Vulnerability Case: The Karachi Malir health crisis (2.4M people, 82nd percentile health) went unnoticed for YEARS because no one questioned aggregate metrics (41st overall). Your job: Ask the right questions BEFORE crises become visible.</a:t>
+              <a:t>Key Insight from Vulnerability Case: The Karachi Malir health crisis (2.4M people, 82nd percentile health) went unnoticed  because no one questioned aggregate metrics (41st overall). Your job: Ask the right questions BEFORE crises become visible.</a:t>
             </a:r>
             <a:endParaRPr lang="en-US" sz="1100" dirty="0"/>
           </a:p>
@@ -19553,33 +19553,6 @@
               <a:t>• Open data advocacy</a:t>
             </a:r>
             <a:endParaRPr lang="en-US" sz="1100" dirty="0"/>
-          </a:p>
-        </p:txBody>
-      </p:sp>
-      <p:sp>
-        <p:nvSpPr>
-          <p:cNvPr id="20" name="Shape 18"/>
-          <p:cNvSpPr/>
-          <p:nvPr/>
-        </p:nvSpPr>
-        <p:spPr>
-          <a:xfrm>
-            <a:off x="640080" y="3657600"/>
-            <a:ext cx="7863840" cy="548640"/>
-          </a:xfrm>
-          <a:prstGeom prst="rect">
-            <a:avLst/>
-          </a:prstGeom>
-          <a:solidFill>
-            <a:srgbClr val="16A085"/>
-          </a:solidFill>
-          <a:ln/>
-        </p:spPr>
-        <p:txBody>
-          <a:bodyPr/>
-          <a:lstStyle/>
-          <a:p>
-            <a:endParaRPr lang="en-PK"/>
           </a:p>
         </p:txBody>
       </p:sp>

</xml_diff>